<commit_message>
Erstellung der "Tasks anzeigen" Fenster (alle und unerledigt): -Task-ArrayList zu Task-Array Methode und Task-Object zu Object-Array Methode; Insgesamt zur Umwandlung aller Task-Objekte in ein 2D Object Array für die tabellarische Darstellung in Swift -Filterung im "unerledigte Tasks anzeigen" Fenster über löschen der Tabellenzeilen nach Erstellung über Wert in der Status Spalte des Weiteren: -"zurück zum Hauptmenü Button" erstellt -Icons zu den Buttons im "Tasks hinzufügen" Fenster hinzugefügt
</commit_message>
<xml_diff>
--- a/ToDo_List/PNG-Workspace.pptx
+++ b/ToDo_List/PNG-Workspace.pptx
@@ -104,6 +104,11 @@
       </a:defRPr>
     </a:lvl9pPr>
   </p:defaultTextStyle>
+  <p:extLst>
+    <p:ext uri="{EFAFB233-063F-42B5-8137-9DF3F51BA10A}">
+      <p15:sldGuideLst xmlns:p15="http://schemas.microsoft.com/office/powerpoint/2012/main"/>
+    </p:ext>
+  </p:extLst>
 </p:presentation>
 </file>
 
@@ -254,7 +259,7 @@
           <a:p>
             <a:fld id="{3BBFB5B4-3158-4DCF-9CDF-FB2565B8D4C2}" type="datetimeFigureOut">
               <a:rPr lang="de-DE" smtClean="0"/>
-              <a:t>16.06.2024</a:t>
+              <a:t>22.06.2024</a:t>
             </a:fld>
             <a:endParaRPr lang="de-DE"/>
           </a:p>
@@ -452,7 +457,7 @@
           <a:p>
             <a:fld id="{3BBFB5B4-3158-4DCF-9CDF-FB2565B8D4C2}" type="datetimeFigureOut">
               <a:rPr lang="de-DE" smtClean="0"/>
-              <a:t>16.06.2024</a:t>
+              <a:t>22.06.2024</a:t>
             </a:fld>
             <a:endParaRPr lang="de-DE"/>
           </a:p>
@@ -660,7 +665,7 @@
           <a:p>
             <a:fld id="{3BBFB5B4-3158-4DCF-9CDF-FB2565B8D4C2}" type="datetimeFigureOut">
               <a:rPr lang="de-DE" smtClean="0"/>
-              <a:t>16.06.2024</a:t>
+              <a:t>22.06.2024</a:t>
             </a:fld>
             <a:endParaRPr lang="de-DE"/>
           </a:p>
@@ -858,7 +863,7 @@
           <a:p>
             <a:fld id="{3BBFB5B4-3158-4DCF-9CDF-FB2565B8D4C2}" type="datetimeFigureOut">
               <a:rPr lang="de-DE" smtClean="0"/>
-              <a:t>16.06.2024</a:t>
+              <a:t>22.06.2024</a:t>
             </a:fld>
             <a:endParaRPr lang="de-DE"/>
           </a:p>
@@ -1133,7 +1138,7 @@
           <a:p>
             <a:fld id="{3BBFB5B4-3158-4DCF-9CDF-FB2565B8D4C2}" type="datetimeFigureOut">
               <a:rPr lang="de-DE" smtClean="0"/>
-              <a:t>16.06.2024</a:t>
+              <a:t>22.06.2024</a:t>
             </a:fld>
             <a:endParaRPr lang="de-DE"/>
           </a:p>
@@ -1398,7 +1403,7 @@
           <a:p>
             <a:fld id="{3BBFB5B4-3158-4DCF-9CDF-FB2565B8D4C2}" type="datetimeFigureOut">
               <a:rPr lang="de-DE" smtClean="0"/>
-              <a:t>16.06.2024</a:t>
+              <a:t>22.06.2024</a:t>
             </a:fld>
             <a:endParaRPr lang="de-DE"/>
           </a:p>
@@ -1810,7 +1815,7 @@
           <a:p>
             <a:fld id="{3BBFB5B4-3158-4DCF-9CDF-FB2565B8D4C2}" type="datetimeFigureOut">
               <a:rPr lang="de-DE" smtClean="0"/>
-              <a:t>16.06.2024</a:t>
+              <a:t>22.06.2024</a:t>
             </a:fld>
             <a:endParaRPr lang="de-DE"/>
           </a:p>
@@ -1951,7 +1956,7 @@
           <a:p>
             <a:fld id="{3BBFB5B4-3158-4DCF-9CDF-FB2565B8D4C2}" type="datetimeFigureOut">
               <a:rPr lang="de-DE" smtClean="0"/>
-              <a:t>16.06.2024</a:t>
+              <a:t>22.06.2024</a:t>
             </a:fld>
             <a:endParaRPr lang="de-DE"/>
           </a:p>
@@ -2064,7 +2069,7 @@
           <a:p>
             <a:fld id="{3BBFB5B4-3158-4DCF-9CDF-FB2565B8D4C2}" type="datetimeFigureOut">
               <a:rPr lang="de-DE" smtClean="0"/>
-              <a:t>16.06.2024</a:t>
+              <a:t>22.06.2024</a:t>
             </a:fld>
             <a:endParaRPr lang="de-DE"/>
           </a:p>
@@ -2375,7 +2380,7 @@
           <a:p>
             <a:fld id="{3BBFB5B4-3158-4DCF-9CDF-FB2565B8D4C2}" type="datetimeFigureOut">
               <a:rPr lang="de-DE" smtClean="0"/>
-              <a:t>16.06.2024</a:t>
+              <a:t>22.06.2024</a:t>
             </a:fld>
             <a:endParaRPr lang="de-DE"/>
           </a:p>
@@ -2663,7 +2668,7 @@
           <a:p>
             <a:fld id="{3BBFB5B4-3158-4DCF-9CDF-FB2565B8D4C2}" type="datetimeFigureOut">
               <a:rPr lang="de-DE" smtClean="0"/>
-              <a:t>16.06.2024</a:t>
+              <a:t>22.06.2024</a:t>
             </a:fld>
             <a:endParaRPr lang="de-DE"/>
           </a:p>
@@ -2904,7 +2909,7 @@
           <a:p>
             <a:fld id="{3BBFB5B4-3158-4DCF-9CDF-FB2565B8D4C2}" type="datetimeFigureOut">
               <a:rPr lang="de-DE" smtClean="0"/>
-              <a:t>16.06.2024</a:t>
+              <a:t>22.06.2024</a:t>
             </a:fld>
             <a:endParaRPr lang="de-DE"/>
           </a:p>
@@ -3697,6 +3702,42 @@
           </a:p>
         </p:txBody>
       </p:sp>
+      <p:pic>
+        <p:nvPicPr>
+          <p:cNvPr id="14" name="Grafik 13" descr="Ein Bild, das Text, Kreis, Entwurf, Schwarz enthält.&#10;&#10;Automatisch generierte Beschreibung">
+            <a:extLst>
+              <a:ext uri="{FF2B5EF4-FFF2-40B4-BE49-F238E27FC236}">
+                <a16:creationId xmlns:a16="http://schemas.microsoft.com/office/drawing/2014/main" id="{A436819C-AC36-4EC8-166D-08B7B325891A}"/>
+              </a:ext>
+            </a:extLst>
+          </p:cNvPr>
+          <p:cNvPicPr>
+            <a:picLocks noChangeAspect="1"/>
+          </p:cNvPicPr>
+          <p:nvPr/>
+        </p:nvPicPr>
+        <p:blipFill>
+          <a:blip r:embed="rId6">
+            <a:extLst>
+              <a:ext uri="{28A0092B-C50C-407E-A947-70E740481C1C}">
+                <a14:useLocalDpi xmlns:a14="http://schemas.microsoft.com/office/drawing/2010/main" val="0"/>
+              </a:ext>
+            </a:extLst>
+          </a:blip>
+          <a:stretch>
+            <a:fillRect/>
+          </a:stretch>
+        </p:blipFill>
+        <p:spPr>
+          <a:xfrm>
+            <a:off x="7905823" y="3049717"/>
+            <a:ext cx="612870" cy="612870"/>
+          </a:xfrm>
+          <a:prstGeom prst="rect">
+            <a:avLst/>
+          </a:prstGeom>
+        </p:spPr>
+      </p:pic>
     </p:spTree>
     <p:extLst>
       <p:ext uri="{BB962C8B-B14F-4D97-AF65-F5344CB8AC3E}">

</xml_diff>

<commit_message>
finale Funktionalitäten für Version 1.0: -Tasks auf erledigt/unerledigt setzten über Checkbox innerhalb der Status Spalte der Tabelle möglich (im "alle Tasks anzeigen" und im "unerldigte Tasks anzeigen" Fenster) -Button zum Aktualisieren der Tabelle im "unerldigte Tasks anzeigen" Fenster -die Aktionen "zurück zum Hauptmenü", "erledigte Tasks löschen" und Tabelle aktualisieren Speichern nun den User Input der Status-Spalte in die aktuelle TaskList-Objekt Datei des Weiteren: -Ausführbare Jar Datei "ToDo-Planner.jar" dieser Version ebenfalls im Repository Ordner -UI Anpassung der Größe von Fenster, Panel und Buttons an Inhalt -"Task mit dem Titel exisitert bereits"-Exception für Task-anlegen Funktion eingeführt -custom checkBox Icons
</commit_message>
<xml_diff>
--- a/ToDo_List/PNG-Workspace.pptx
+++ b/ToDo_List/PNG-Workspace.pptx
@@ -259,7 +259,7 @@
           <a:p>
             <a:fld id="{3BBFB5B4-3158-4DCF-9CDF-FB2565B8D4C2}" type="datetimeFigureOut">
               <a:rPr lang="de-DE" smtClean="0"/>
-              <a:t>22.06.2024</a:t>
+              <a:t>24.06.2024</a:t>
             </a:fld>
             <a:endParaRPr lang="de-DE"/>
           </a:p>
@@ -457,7 +457,7 @@
           <a:p>
             <a:fld id="{3BBFB5B4-3158-4DCF-9CDF-FB2565B8D4C2}" type="datetimeFigureOut">
               <a:rPr lang="de-DE" smtClean="0"/>
-              <a:t>22.06.2024</a:t>
+              <a:t>24.06.2024</a:t>
             </a:fld>
             <a:endParaRPr lang="de-DE"/>
           </a:p>
@@ -665,7 +665,7 @@
           <a:p>
             <a:fld id="{3BBFB5B4-3158-4DCF-9CDF-FB2565B8D4C2}" type="datetimeFigureOut">
               <a:rPr lang="de-DE" smtClean="0"/>
-              <a:t>22.06.2024</a:t>
+              <a:t>24.06.2024</a:t>
             </a:fld>
             <a:endParaRPr lang="de-DE"/>
           </a:p>
@@ -863,7 +863,7 @@
           <a:p>
             <a:fld id="{3BBFB5B4-3158-4DCF-9CDF-FB2565B8D4C2}" type="datetimeFigureOut">
               <a:rPr lang="de-DE" smtClean="0"/>
-              <a:t>22.06.2024</a:t>
+              <a:t>24.06.2024</a:t>
             </a:fld>
             <a:endParaRPr lang="de-DE"/>
           </a:p>
@@ -1138,7 +1138,7 @@
           <a:p>
             <a:fld id="{3BBFB5B4-3158-4DCF-9CDF-FB2565B8D4C2}" type="datetimeFigureOut">
               <a:rPr lang="de-DE" smtClean="0"/>
-              <a:t>22.06.2024</a:t>
+              <a:t>24.06.2024</a:t>
             </a:fld>
             <a:endParaRPr lang="de-DE"/>
           </a:p>
@@ -1403,7 +1403,7 @@
           <a:p>
             <a:fld id="{3BBFB5B4-3158-4DCF-9CDF-FB2565B8D4C2}" type="datetimeFigureOut">
               <a:rPr lang="de-DE" smtClean="0"/>
-              <a:t>22.06.2024</a:t>
+              <a:t>24.06.2024</a:t>
             </a:fld>
             <a:endParaRPr lang="de-DE"/>
           </a:p>
@@ -1815,7 +1815,7 @@
           <a:p>
             <a:fld id="{3BBFB5B4-3158-4DCF-9CDF-FB2565B8D4C2}" type="datetimeFigureOut">
               <a:rPr lang="de-DE" smtClean="0"/>
-              <a:t>22.06.2024</a:t>
+              <a:t>24.06.2024</a:t>
             </a:fld>
             <a:endParaRPr lang="de-DE"/>
           </a:p>
@@ -1956,7 +1956,7 @@
           <a:p>
             <a:fld id="{3BBFB5B4-3158-4DCF-9CDF-FB2565B8D4C2}" type="datetimeFigureOut">
               <a:rPr lang="de-DE" smtClean="0"/>
-              <a:t>22.06.2024</a:t>
+              <a:t>24.06.2024</a:t>
             </a:fld>
             <a:endParaRPr lang="de-DE"/>
           </a:p>
@@ -2069,7 +2069,7 @@
           <a:p>
             <a:fld id="{3BBFB5B4-3158-4DCF-9CDF-FB2565B8D4C2}" type="datetimeFigureOut">
               <a:rPr lang="de-DE" smtClean="0"/>
-              <a:t>22.06.2024</a:t>
+              <a:t>24.06.2024</a:t>
             </a:fld>
             <a:endParaRPr lang="de-DE"/>
           </a:p>
@@ -2380,7 +2380,7 @@
           <a:p>
             <a:fld id="{3BBFB5B4-3158-4DCF-9CDF-FB2565B8D4C2}" type="datetimeFigureOut">
               <a:rPr lang="de-DE" smtClean="0"/>
-              <a:t>22.06.2024</a:t>
+              <a:t>24.06.2024</a:t>
             </a:fld>
             <a:endParaRPr lang="de-DE"/>
           </a:p>
@@ -2668,7 +2668,7 @@
           <a:p>
             <a:fld id="{3BBFB5B4-3158-4DCF-9CDF-FB2565B8D4C2}" type="datetimeFigureOut">
               <a:rPr lang="de-DE" smtClean="0"/>
-              <a:t>22.06.2024</a:t>
+              <a:t>24.06.2024</a:t>
             </a:fld>
             <a:endParaRPr lang="de-DE"/>
           </a:p>
@@ -2909,7 +2909,7 @@
           <a:p>
             <a:fld id="{3BBFB5B4-3158-4DCF-9CDF-FB2565B8D4C2}" type="datetimeFigureOut">
               <a:rPr lang="de-DE" smtClean="0"/>
-              <a:t>22.06.2024</a:t>
+              <a:t>24.06.2024</a:t>
             </a:fld>
             <a:endParaRPr lang="de-DE"/>
           </a:p>
@@ -3732,6 +3732,123 @@
           <a:xfrm>
             <a:off x="7905823" y="3049717"/>
             <a:ext cx="612870" cy="612870"/>
+          </a:xfrm>
+          <a:prstGeom prst="rect">
+            <a:avLst/>
+          </a:prstGeom>
+        </p:spPr>
+      </p:pic>
+      <p:pic>
+        <p:nvPicPr>
+          <p:cNvPr id="3" name="Grafik 2" descr="Häkchen mit einfarbiger Füllung">
+            <a:extLst>
+              <a:ext uri="{FF2B5EF4-FFF2-40B4-BE49-F238E27FC236}">
+                <a16:creationId xmlns:a16="http://schemas.microsoft.com/office/drawing/2014/main" id="{1C4149EB-D58B-B7FF-E01B-88448A081099}"/>
+              </a:ext>
+            </a:extLst>
+          </p:cNvPr>
+          <p:cNvPicPr>
+            <a:picLocks noChangeAspect="1"/>
+          </p:cNvPicPr>
+          <p:nvPr/>
+        </p:nvPicPr>
+        <p:blipFill>
+          <a:blip r:embed="rId7">
+            <a:extLst>
+              <a:ext uri="{28A0092B-C50C-407E-A947-70E740481C1C}">
+                <a14:useLocalDpi xmlns:a14="http://schemas.microsoft.com/office/drawing/2010/main" val="0"/>
+              </a:ext>
+              <a:ext uri="{96DAC541-7B7A-43D3-8B79-37D633B846F1}">
+                <asvg:svgBlip xmlns:asvg="http://schemas.microsoft.com/office/drawing/2016/SVG/main" r:embed="rId8"/>
+              </a:ext>
+            </a:extLst>
+          </a:blip>
+          <a:stretch>
+            <a:fillRect/>
+          </a:stretch>
+        </p:blipFill>
+        <p:spPr>
+          <a:xfrm>
+            <a:off x="9937543" y="2961508"/>
+            <a:ext cx="914400" cy="914400"/>
+          </a:xfrm>
+          <a:prstGeom prst="rect">
+            <a:avLst/>
+          </a:prstGeom>
+        </p:spPr>
+      </p:pic>
+      <p:pic>
+        <p:nvPicPr>
+          <p:cNvPr id="8" name="Grafik 7" descr="Schließen mit einfarbiger Füllung">
+            <a:extLst>
+              <a:ext uri="{FF2B5EF4-FFF2-40B4-BE49-F238E27FC236}">
+                <a16:creationId xmlns:a16="http://schemas.microsoft.com/office/drawing/2014/main" id="{CDD1274F-111B-02F5-76A2-4A11712366A7}"/>
+              </a:ext>
+            </a:extLst>
+          </p:cNvPr>
+          <p:cNvPicPr>
+            <a:picLocks noChangeAspect="1"/>
+          </p:cNvPicPr>
+          <p:nvPr/>
+        </p:nvPicPr>
+        <p:blipFill>
+          <a:blip r:embed="rId9">
+            <a:extLst>
+              <a:ext uri="{28A0092B-C50C-407E-A947-70E740481C1C}">
+                <a14:useLocalDpi xmlns:a14="http://schemas.microsoft.com/office/drawing/2010/main" val="0"/>
+              </a:ext>
+              <a:ext uri="{96DAC541-7B7A-43D3-8B79-37D633B846F1}">
+                <asvg:svgBlip xmlns:asvg="http://schemas.microsoft.com/office/drawing/2016/SVG/main" r:embed="rId10"/>
+              </a:ext>
+            </a:extLst>
+          </a:blip>
+          <a:stretch>
+            <a:fillRect/>
+          </a:stretch>
+        </p:blipFill>
+        <p:spPr>
+          <a:xfrm>
+            <a:off x="8988909" y="3025184"/>
+            <a:ext cx="753441" cy="753441"/>
+          </a:xfrm>
+          <a:prstGeom prst="rect">
+            <a:avLst/>
+          </a:prstGeom>
+        </p:spPr>
+      </p:pic>
+      <p:pic>
+        <p:nvPicPr>
+          <p:cNvPr id="4" name="Grafik 3" descr="Wiederholen mit einfarbiger Füllung">
+            <a:extLst>
+              <a:ext uri="{FF2B5EF4-FFF2-40B4-BE49-F238E27FC236}">
+                <a16:creationId xmlns:a16="http://schemas.microsoft.com/office/drawing/2014/main" id="{9BB5CE6C-D0CE-88C1-4BEE-A1049680A758}"/>
+              </a:ext>
+            </a:extLst>
+          </p:cNvPr>
+          <p:cNvPicPr>
+            <a:picLocks noChangeAspect="1"/>
+          </p:cNvPicPr>
+          <p:nvPr/>
+        </p:nvPicPr>
+        <p:blipFill>
+          <a:blip r:embed="rId11">
+            <a:extLst>
+              <a:ext uri="{28A0092B-C50C-407E-A947-70E740481C1C}">
+                <a14:useLocalDpi xmlns:a14="http://schemas.microsoft.com/office/drawing/2010/main" val="0"/>
+              </a:ext>
+              <a:ext uri="{96DAC541-7B7A-43D3-8B79-37D633B846F1}">
+                <asvg:svgBlip xmlns:asvg="http://schemas.microsoft.com/office/drawing/2016/SVG/main" r:embed="rId12"/>
+              </a:ext>
+            </a:extLst>
+          </a:blip>
+          <a:stretch>
+            <a:fillRect/>
+          </a:stretch>
+        </p:blipFill>
+        <p:spPr>
+          <a:xfrm>
+            <a:off x="857116" y="2901099"/>
+            <a:ext cx="834879" cy="834879"/>
           </a:xfrm>
           <a:prstGeom prst="rect">
             <a:avLst/>

</xml_diff>